<commit_message>
Added section on Kirchhoffs rules
</commit_message>
<xml_diff>
--- a/tex/figures/Circuits/Figures.pptx
+++ b/tex/figures/Circuits/Figures.pptx
@@ -199,7 +199,7 @@
           <a:p>
             <a:fld id="{FA15A6B2-55AC-CD4B-A1E6-BB01091FE9DC}" type="datetimeFigureOut">
               <a:rPr lang="en-US" smtClean="0"/>
-              <a:t>6/26/2019</a:t>
+              <a:t>6/27/2019</a:t>
             </a:fld>
             <a:endParaRPr lang="en-US"/>
           </a:p>
@@ -598,7 +598,7 @@
           <a:p>
             <a:fld id="{F7249F8D-641B-4CAF-BAE5-10524742F6F1}" type="datetimeFigureOut">
               <a:rPr lang="en-CA" smtClean="0"/>
-              <a:t>2019-06-26</a:t>
+              <a:t>2019-06-27</a:t>
             </a:fld>
             <a:endParaRPr lang="en-CA"/>
           </a:p>
@@ -768,7 +768,7 @@
           <a:p>
             <a:fld id="{F7249F8D-641B-4CAF-BAE5-10524742F6F1}" type="datetimeFigureOut">
               <a:rPr lang="en-CA" smtClean="0"/>
-              <a:t>2019-06-26</a:t>
+              <a:t>2019-06-27</a:t>
             </a:fld>
             <a:endParaRPr lang="en-CA"/>
           </a:p>
@@ -948,7 +948,7 @@
           <a:p>
             <a:fld id="{F7249F8D-641B-4CAF-BAE5-10524742F6F1}" type="datetimeFigureOut">
               <a:rPr lang="en-CA" smtClean="0"/>
-              <a:t>2019-06-26</a:t>
+              <a:t>2019-06-27</a:t>
             </a:fld>
             <a:endParaRPr lang="en-CA"/>
           </a:p>
@@ -1118,7 +1118,7 @@
           <a:p>
             <a:fld id="{F7249F8D-641B-4CAF-BAE5-10524742F6F1}" type="datetimeFigureOut">
               <a:rPr lang="en-CA" smtClean="0"/>
-              <a:t>2019-06-26</a:t>
+              <a:t>2019-06-27</a:t>
             </a:fld>
             <a:endParaRPr lang="en-CA"/>
           </a:p>
@@ -1364,7 +1364,7 @@
           <a:p>
             <a:fld id="{F7249F8D-641B-4CAF-BAE5-10524742F6F1}" type="datetimeFigureOut">
               <a:rPr lang="en-CA" smtClean="0"/>
-              <a:t>2019-06-26</a:t>
+              <a:t>2019-06-27</a:t>
             </a:fld>
             <a:endParaRPr lang="en-CA"/>
           </a:p>
@@ -1596,7 +1596,7 @@
           <a:p>
             <a:fld id="{F7249F8D-641B-4CAF-BAE5-10524742F6F1}" type="datetimeFigureOut">
               <a:rPr lang="en-CA" smtClean="0"/>
-              <a:t>2019-06-26</a:t>
+              <a:t>2019-06-27</a:t>
             </a:fld>
             <a:endParaRPr lang="en-CA"/>
           </a:p>
@@ -1963,7 +1963,7 @@
           <a:p>
             <a:fld id="{F7249F8D-641B-4CAF-BAE5-10524742F6F1}" type="datetimeFigureOut">
               <a:rPr lang="en-CA" smtClean="0"/>
-              <a:t>2019-06-26</a:t>
+              <a:t>2019-06-27</a:t>
             </a:fld>
             <a:endParaRPr lang="en-CA"/>
           </a:p>
@@ -2081,7 +2081,7 @@
           <a:p>
             <a:fld id="{F7249F8D-641B-4CAF-BAE5-10524742F6F1}" type="datetimeFigureOut">
               <a:rPr lang="en-CA" smtClean="0"/>
-              <a:t>2019-06-26</a:t>
+              <a:t>2019-06-27</a:t>
             </a:fld>
             <a:endParaRPr lang="en-CA"/>
           </a:p>
@@ -2176,7 +2176,7 @@
           <a:p>
             <a:fld id="{F7249F8D-641B-4CAF-BAE5-10524742F6F1}" type="datetimeFigureOut">
               <a:rPr lang="en-CA" smtClean="0"/>
-              <a:t>2019-06-26</a:t>
+              <a:t>2019-06-27</a:t>
             </a:fld>
             <a:endParaRPr lang="en-CA"/>
           </a:p>
@@ -2453,7 +2453,7 @@
           <a:p>
             <a:fld id="{F7249F8D-641B-4CAF-BAE5-10524742F6F1}" type="datetimeFigureOut">
               <a:rPr lang="en-CA" smtClean="0"/>
-              <a:t>2019-06-26</a:t>
+              <a:t>2019-06-27</a:t>
             </a:fld>
             <a:endParaRPr lang="en-CA"/>
           </a:p>
@@ -2706,7 +2706,7 @@
           <a:p>
             <a:fld id="{F7249F8D-641B-4CAF-BAE5-10524742F6F1}" type="datetimeFigureOut">
               <a:rPr lang="en-CA" smtClean="0"/>
-              <a:t>2019-06-26</a:t>
+              <a:t>2019-06-27</a:t>
             </a:fld>
             <a:endParaRPr lang="en-CA"/>
           </a:p>
@@ -2919,7 +2919,7 @@
           <a:p>
             <a:fld id="{F7249F8D-641B-4CAF-BAE5-10524742F6F1}" type="datetimeFigureOut">
               <a:rPr lang="en-CA" smtClean="0"/>
-              <a:t>2019-06-26</a:t>
+              <a:t>2019-06-27</a:t>
             </a:fld>
             <a:endParaRPr lang="en-CA"/>
           </a:p>
@@ -11146,8 +11146,8 @@
             </a:p>
           </p:txBody>
         </p:sp>
-        <mc:AlternateContent xmlns:mc="http://schemas.openxmlformats.org/markup-compatibility/2006">
-          <mc:Choice xmlns:a14="http://schemas.microsoft.com/office/drawing/2010/main" Requires="a14">
+        <mc:AlternateContent xmlns:mc="http://schemas.openxmlformats.org/markup-compatibility/2006" xmlns:a14="http://schemas.microsoft.com/office/drawing/2010/main">
+          <mc:Choice Requires="a14">
             <p:sp>
               <p:nvSpPr>
                 <p:cNvPr id="20" name="TextBox 30"/>
@@ -11285,7 +11285,7 @@
               </p:txBody>
             </p:sp>
           </mc:Choice>
-          <mc:Fallback>
+          <mc:Fallback xmlns="">
             <p:sp>
               <p:nvSpPr>
                 <p:cNvPr id="20" name="TextBox 30"/>
@@ -11324,8 +11324,8 @@
             </p:sp>
           </mc:Fallback>
         </mc:AlternateContent>
-        <mc:AlternateContent xmlns:mc="http://schemas.openxmlformats.org/markup-compatibility/2006">
-          <mc:Choice xmlns:a14="http://schemas.microsoft.com/office/drawing/2010/main" Requires="a14">
+        <mc:AlternateContent xmlns:mc="http://schemas.openxmlformats.org/markup-compatibility/2006" xmlns:a14="http://schemas.microsoft.com/office/drawing/2010/main">
+          <mc:Choice Requires="a14">
             <p:sp>
               <p:nvSpPr>
                 <p:cNvPr id="21" name="TextBox 31"/>
@@ -11484,7 +11484,7 @@
               </p:txBody>
             </p:sp>
           </mc:Choice>
-          <mc:Fallback>
+          <mc:Fallback xmlns="">
             <p:sp>
               <p:nvSpPr>
                 <p:cNvPr id="21" name="TextBox 31"/>
@@ -11843,8 +11843,8 @@
             </a:fontRef>
           </p:style>
         </p:cxnSp>
-        <mc:AlternateContent xmlns:mc="http://schemas.openxmlformats.org/markup-compatibility/2006">
-          <mc:Choice xmlns:a14="http://schemas.microsoft.com/office/drawing/2010/main" Requires="a14">
+        <mc:AlternateContent xmlns:mc="http://schemas.openxmlformats.org/markup-compatibility/2006" xmlns:a14="http://schemas.microsoft.com/office/drawing/2010/main">
+          <mc:Choice Requires="a14">
             <p:sp>
               <p:nvSpPr>
                 <p:cNvPr id="26" name="TextBox 25"/>
@@ -11867,6 +11867,7 @@
                 </a:bodyPr>
                 <a:lstStyle/>
                 <a:p>
+                  <a:pPr/>
                   <a14:m>
                     <m:oMathPara xmlns:m="http://schemas.openxmlformats.org/officeDocument/2006/math">
                       <m:oMathParaPr>
@@ -11936,7 +11937,7 @@
               </p:txBody>
             </p:sp>
           </mc:Choice>
-          <mc:Fallback>
+          <mc:Fallback xmlns="">
             <p:sp>
               <p:nvSpPr>
                 <p:cNvPr id="26" name="TextBox 25"/>

</xml_diff>